<commit_message>
updated quick user interface guide
</commit_message>
<xml_diff>
--- a/vscode-pvs/screenshots/vscode-pvs-user-interface.pptx
+++ b/vscode-pvs/screenshots/vscode-pvs-user-interface.pptx
@@ -259,7 +259,7 @@
           <a:p>
             <a:fld id="{238F43D6-CAA3-0448-A70D-1EAA2E9D070A}" type="datetimeFigureOut">
               <a:rPr lang="en-US" smtClean="0"/>
-              <a:t>10/23/20</a:t>
+              <a:t>2/5/21</a:t>
             </a:fld>
             <a:endParaRPr lang="en-US"/>
           </a:p>
@@ -457,7 +457,7 @@
           <a:p>
             <a:fld id="{238F43D6-CAA3-0448-A70D-1EAA2E9D070A}" type="datetimeFigureOut">
               <a:rPr lang="en-US" smtClean="0"/>
-              <a:t>10/23/20</a:t>
+              <a:t>2/5/21</a:t>
             </a:fld>
             <a:endParaRPr lang="en-US"/>
           </a:p>
@@ -665,7 +665,7 @@
           <a:p>
             <a:fld id="{238F43D6-CAA3-0448-A70D-1EAA2E9D070A}" type="datetimeFigureOut">
               <a:rPr lang="en-US" smtClean="0"/>
-              <a:t>10/23/20</a:t>
+              <a:t>2/5/21</a:t>
             </a:fld>
             <a:endParaRPr lang="en-US"/>
           </a:p>
@@ -863,7 +863,7 @@
           <a:p>
             <a:fld id="{238F43D6-CAA3-0448-A70D-1EAA2E9D070A}" type="datetimeFigureOut">
               <a:rPr lang="en-US" smtClean="0"/>
-              <a:t>10/23/20</a:t>
+              <a:t>2/5/21</a:t>
             </a:fld>
             <a:endParaRPr lang="en-US"/>
           </a:p>
@@ -1138,7 +1138,7 @@
           <a:p>
             <a:fld id="{238F43D6-CAA3-0448-A70D-1EAA2E9D070A}" type="datetimeFigureOut">
               <a:rPr lang="en-US" smtClean="0"/>
-              <a:t>10/23/20</a:t>
+              <a:t>2/5/21</a:t>
             </a:fld>
             <a:endParaRPr lang="en-US"/>
           </a:p>
@@ -1403,7 +1403,7 @@
           <a:p>
             <a:fld id="{238F43D6-CAA3-0448-A70D-1EAA2E9D070A}" type="datetimeFigureOut">
               <a:rPr lang="en-US" smtClean="0"/>
-              <a:t>10/23/20</a:t>
+              <a:t>2/5/21</a:t>
             </a:fld>
             <a:endParaRPr lang="en-US"/>
           </a:p>
@@ -1815,7 +1815,7 @@
           <a:p>
             <a:fld id="{238F43D6-CAA3-0448-A70D-1EAA2E9D070A}" type="datetimeFigureOut">
               <a:rPr lang="en-US" smtClean="0"/>
-              <a:t>10/23/20</a:t>
+              <a:t>2/5/21</a:t>
             </a:fld>
             <a:endParaRPr lang="en-US"/>
           </a:p>
@@ -1956,7 +1956,7 @@
           <a:p>
             <a:fld id="{238F43D6-CAA3-0448-A70D-1EAA2E9D070A}" type="datetimeFigureOut">
               <a:rPr lang="en-US" smtClean="0"/>
-              <a:t>10/23/20</a:t>
+              <a:t>2/5/21</a:t>
             </a:fld>
             <a:endParaRPr lang="en-US"/>
           </a:p>
@@ -2069,7 +2069,7 @@
           <a:p>
             <a:fld id="{238F43D6-CAA3-0448-A70D-1EAA2E9D070A}" type="datetimeFigureOut">
               <a:rPr lang="en-US" smtClean="0"/>
-              <a:t>10/23/20</a:t>
+              <a:t>2/5/21</a:t>
             </a:fld>
             <a:endParaRPr lang="en-US"/>
           </a:p>
@@ -2380,7 +2380,7 @@
           <a:p>
             <a:fld id="{238F43D6-CAA3-0448-A70D-1EAA2E9D070A}" type="datetimeFigureOut">
               <a:rPr lang="en-US" smtClean="0"/>
-              <a:t>10/23/20</a:t>
+              <a:t>2/5/21</a:t>
             </a:fld>
             <a:endParaRPr lang="en-US"/>
           </a:p>
@@ -2668,7 +2668,7 @@
           <a:p>
             <a:fld id="{238F43D6-CAA3-0448-A70D-1EAA2E9D070A}" type="datetimeFigureOut">
               <a:rPr lang="en-US" smtClean="0"/>
-              <a:t>10/23/20</a:t>
+              <a:t>2/5/21</a:t>
             </a:fld>
             <a:endParaRPr lang="en-US"/>
           </a:p>
@@ -2909,7 +2909,7 @@
           <a:p>
             <a:fld id="{238F43D6-CAA3-0448-A70D-1EAA2E9D070A}" type="datetimeFigureOut">
               <a:rPr lang="en-US" smtClean="0"/>
-              <a:t>10/23/20</a:t>
+              <a:t>2/5/21</a:t>
             </a:fld>
             <a:endParaRPr lang="en-US"/>
           </a:p>
@@ -3339,10 +3339,10 @@
       </p:grpSpPr>
       <p:pic>
         <p:nvPicPr>
-          <p:cNvPr id="6" name="Picture 5">
-            <a:extLst>
-              <a:ext uri="{FF2B5EF4-FFF2-40B4-BE49-F238E27FC236}">
-                <a16:creationId xmlns:a16="http://schemas.microsoft.com/office/drawing/2014/main" id="{DC9D6380-082A-A947-9958-C4218DD6720A}"/>
+          <p:cNvPr id="3" name="Picture 2">
+            <a:extLst>
+              <a:ext uri="{FF2B5EF4-FFF2-40B4-BE49-F238E27FC236}">
+                <a16:creationId xmlns:a16="http://schemas.microsoft.com/office/drawing/2014/main" id="{55613C92-7BFB-0340-9DF2-5C5C5C57F698}"/>
               </a:ext>
             </a:extLst>
           </p:cNvPr>
@@ -3359,8 +3359,8 @@
         </p:blipFill>
         <p:spPr>
           <a:xfrm>
-            <a:off x="1229631" y="691831"/>
-            <a:ext cx="9193043" cy="4707615"/>
+            <a:off x="1212368" y="449573"/>
+            <a:ext cx="9198734" cy="5810635"/>
           </a:xfrm>
           <a:prstGeom prst="rect">
             <a:avLst/>
@@ -3381,8 +3381,8 @@
         </p:nvSpPr>
         <p:spPr>
           <a:xfrm>
-            <a:off x="1223943" y="2285999"/>
-            <a:ext cx="364210" cy="340243"/>
+            <a:off x="1223943" y="2448049"/>
+            <a:ext cx="364210" cy="368779"/>
           </a:xfrm>
           <a:prstGeom prst="rect">
             <a:avLst/>
@@ -3433,8 +3433,8 @@
         </p:nvSpPr>
         <p:spPr>
           <a:xfrm>
-            <a:off x="1588152" y="842838"/>
-            <a:ext cx="2289187" cy="1645181"/>
+            <a:off x="1588152" y="597792"/>
+            <a:ext cx="3053296" cy="2652825"/>
           </a:xfrm>
           <a:prstGeom prst="rect">
             <a:avLst/>
@@ -3485,8 +3485,8 @@
         </p:nvSpPr>
         <p:spPr>
           <a:xfrm>
-            <a:off x="1588153" y="2488019"/>
-            <a:ext cx="2289186" cy="1749068"/>
+            <a:off x="1588153" y="3250618"/>
+            <a:ext cx="3057782" cy="1588375"/>
           </a:xfrm>
           <a:prstGeom prst="rect">
             <a:avLst/>
@@ -3537,8 +3537,8 @@
         </p:nvSpPr>
         <p:spPr>
           <a:xfrm>
-            <a:off x="1588153" y="4237087"/>
-            <a:ext cx="2289186" cy="979955"/>
+            <a:off x="1588152" y="4838997"/>
+            <a:ext cx="3057782" cy="1237711"/>
           </a:xfrm>
           <a:prstGeom prst="rect">
             <a:avLst/>
@@ -3589,8 +3589,8 @@
         </p:nvSpPr>
         <p:spPr>
           <a:xfrm>
-            <a:off x="3884428" y="842838"/>
-            <a:ext cx="6531160" cy="1645181"/>
+            <a:off x="4641448" y="597792"/>
+            <a:ext cx="5774140" cy="2652827"/>
           </a:xfrm>
           <a:prstGeom prst="rect">
             <a:avLst/>
@@ -3641,8 +3641,8 @@
         </p:nvSpPr>
         <p:spPr>
           <a:xfrm>
-            <a:off x="3877339" y="2488019"/>
-            <a:ext cx="6538247" cy="2729023"/>
+            <a:off x="4641446" y="3250621"/>
+            <a:ext cx="5774140" cy="2826087"/>
           </a:xfrm>
           <a:prstGeom prst="rect">
             <a:avLst/>
@@ -3693,7 +3693,7 @@
         </p:nvSpPr>
         <p:spPr>
           <a:xfrm>
-            <a:off x="754710" y="2285999"/>
+            <a:off x="754710" y="2459623"/>
             <a:ext cx="364211" cy="357205"/>
           </a:xfrm>
           <a:prstGeom prst="octagon">
@@ -3779,10 +3779,10 @@
       </p:sp>
       <p:sp>
         <p:nvSpPr>
-          <p:cNvPr id="18" name="Octagon 17">
-            <a:extLst>
-              <a:ext uri="{FF2B5EF4-FFF2-40B4-BE49-F238E27FC236}">
-                <a16:creationId xmlns:a16="http://schemas.microsoft.com/office/drawing/2014/main" id="{946A918E-F8EE-6F40-9E15-048E3BE0D1CF}"/>
+          <p:cNvPr id="19" name="Octagon 18">
+            <a:extLst>
+              <a:ext uri="{FF2B5EF4-FFF2-40B4-BE49-F238E27FC236}">
+                <a16:creationId xmlns:a16="http://schemas.microsoft.com/office/drawing/2014/main" id="{BD089659-D13B-924B-9EAB-C6CF74210547}"/>
               </a:ext>
             </a:extLst>
           </p:cNvPr>
@@ -3791,7 +3791,7 @@
         </p:nvSpPr>
         <p:spPr>
           <a:xfrm>
-            <a:off x="7950843" y="1665428"/>
+            <a:off x="3275668" y="3635359"/>
             <a:ext cx="364211" cy="357205"/>
           </a:xfrm>
           <a:prstGeom prst="octagon">
@@ -3821,17 +3821,17 @@
             <a:pPr algn="ctr"/>
             <a:r>
               <a:rPr lang="en-US" dirty="0"/>
-              <a:t>5</a:t>
-            </a:r>
-          </a:p>
-        </p:txBody>
-      </p:sp>
-      <p:sp>
-        <p:nvSpPr>
-          <p:cNvPr id="19" name="Octagon 18">
-            <a:extLst>
-              <a:ext uri="{FF2B5EF4-FFF2-40B4-BE49-F238E27FC236}">
-                <a16:creationId xmlns:a16="http://schemas.microsoft.com/office/drawing/2014/main" id="{BD089659-D13B-924B-9EAB-C6CF74210547}"/>
+              <a:t>3</a:t>
+            </a:r>
+          </a:p>
+        </p:txBody>
+      </p:sp>
+      <p:sp>
+        <p:nvSpPr>
+          <p:cNvPr id="20" name="Octagon 19">
+            <a:extLst>
+              <a:ext uri="{FF2B5EF4-FFF2-40B4-BE49-F238E27FC236}">
+                <a16:creationId xmlns:a16="http://schemas.microsoft.com/office/drawing/2014/main" id="{B5A32C2E-4FEF-FF4B-9E40-D6E50B39B121}"/>
               </a:ext>
             </a:extLst>
           </p:cNvPr>
@@ -3840,7 +3840,7 @@
         </p:nvSpPr>
         <p:spPr>
           <a:xfrm>
-            <a:off x="3275668" y="3183950"/>
+            <a:off x="7665480" y="4576811"/>
             <a:ext cx="364211" cy="357205"/>
           </a:xfrm>
           <a:prstGeom prst="octagon">
@@ -3870,17 +3870,17 @@
             <a:pPr algn="ctr"/>
             <a:r>
               <a:rPr lang="en-US" dirty="0"/>
-              <a:t>3</a:t>
-            </a:r>
-          </a:p>
-        </p:txBody>
-      </p:sp>
-      <p:sp>
-        <p:nvSpPr>
-          <p:cNvPr id="20" name="Octagon 19">
-            <a:extLst>
-              <a:ext uri="{FF2B5EF4-FFF2-40B4-BE49-F238E27FC236}">
-                <a16:creationId xmlns:a16="http://schemas.microsoft.com/office/drawing/2014/main" id="{B5A32C2E-4FEF-FF4B-9E40-D6E50B39B121}"/>
+              <a:t>6</a:t>
+            </a:r>
+          </a:p>
+        </p:txBody>
+      </p:sp>
+      <p:sp>
+        <p:nvSpPr>
+          <p:cNvPr id="21" name="Octagon 20">
+            <a:extLst>
+              <a:ext uri="{FF2B5EF4-FFF2-40B4-BE49-F238E27FC236}">
+                <a16:creationId xmlns:a16="http://schemas.microsoft.com/office/drawing/2014/main" id="{1731E1B3-E4F2-A246-BADE-2C282B49133A}"/>
               </a:ext>
             </a:extLst>
           </p:cNvPr>
@@ -3889,7 +3889,7 @@
         </p:nvSpPr>
         <p:spPr>
           <a:xfrm>
-            <a:off x="7950842" y="4058484"/>
+            <a:off x="3275667" y="5335538"/>
             <a:ext cx="364211" cy="357205"/>
           </a:xfrm>
           <a:prstGeom prst="octagon">
@@ -3919,17 +3919,17 @@
             <a:pPr algn="ctr"/>
             <a:r>
               <a:rPr lang="en-US" dirty="0"/>
-              <a:t>6</a:t>
-            </a:r>
-          </a:p>
-        </p:txBody>
-      </p:sp>
-      <p:sp>
-        <p:nvSpPr>
-          <p:cNvPr id="21" name="Octagon 20">
-            <a:extLst>
-              <a:ext uri="{FF2B5EF4-FFF2-40B4-BE49-F238E27FC236}">
-                <a16:creationId xmlns:a16="http://schemas.microsoft.com/office/drawing/2014/main" id="{1731E1B3-E4F2-A246-BADE-2C282B49133A}"/>
+              <a:t>4</a:t>
+            </a:r>
+          </a:p>
+        </p:txBody>
+      </p:sp>
+      <p:sp>
+        <p:nvSpPr>
+          <p:cNvPr id="22" name="Rectangle 21">
+            <a:extLst>
+              <a:ext uri="{FF2B5EF4-FFF2-40B4-BE49-F238E27FC236}">
+                <a16:creationId xmlns:a16="http://schemas.microsoft.com/office/drawing/2014/main" id="{7012E804-99FE-FB4B-A97C-8D65FFC72300}"/>
               </a:ext>
             </a:extLst>
           </p:cNvPr>
@@ -3938,7 +3938,59 @@
         </p:nvSpPr>
         <p:spPr>
           <a:xfrm>
-            <a:off x="3275667" y="4548461"/>
+            <a:off x="7950842" y="597791"/>
+            <a:ext cx="2460260" cy="357205"/>
+          </a:xfrm>
+          <a:prstGeom prst="rect">
+            <a:avLst/>
+          </a:prstGeom>
+          <a:noFill/>
+          <a:ln w="19050" cmpd="sng">
+            <a:solidFill>
+              <a:srgbClr val="FFFF00"/>
+            </a:solidFill>
+          </a:ln>
+        </p:spPr>
+        <p:style>
+          <a:lnRef idx="2">
+            <a:schemeClr val="accent1">
+              <a:shade val="50000"/>
+            </a:schemeClr>
+          </a:lnRef>
+          <a:fillRef idx="1">
+            <a:schemeClr val="accent1"/>
+          </a:fillRef>
+          <a:effectRef idx="0">
+            <a:schemeClr val="accent1"/>
+          </a:effectRef>
+          <a:fontRef idx="minor">
+            <a:schemeClr val="lt1"/>
+          </a:fontRef>
+        </p:style>
+        <p:txBody>
+          <a:bodyPr rtlCol="0" anchor="ctr"/>
+          <a:lstStyle/>
+          <a:p>
+            <a:pPr algn="ctr"/>
+            <a:endParaRPr lang="en-US"/>
+          </a:p>
+        </p:txBody>
+      </p:sp>
+      <p:sp>
+        <p:nvSpPr>
+          <p:cNvPr id="23" name="Octagon 22">
+            <a:extLst>
+              <a:ext uri="{FF2B5EF4-FFF2-40B4-BE49-F238E27FC236}">
+                <a16:creationId xmlns:a16="http://schemas.microsoft.com/office/drawing/2014/main" id="{750DFA25-A98B-E94A-BFA0-25F87B44921C}"/>
+              </a:ext>
+            </a:extLst>
+          </p:cNvPr>
+          <p:cNvSpPr/>
+          <p:nvPr/>
+        </p:nvSpPr>
+        <p:spPr>
+          <a:xfrm>
+            <a:off x="7665480" y="1301310"/>
             <a:ext cx="364211" cy="357205"/>
           </a:xfrm>
           <a:prstGeom prst="octagon">
@@ -3968,7 +4020,56 @@
             <a:pPr algn="ctr"/>
             <a:r>
               <a:rPr lang="en-US" dirty="0"/>
-              <a:t>4</a:t>
+              <a:t>5</a:t>
+            </a:r>
+          </a:p>
+        </p:txBody>
+      </p:sp>
+      <p:sp>
+        <p:nvSpPr>
+          <p:cNvPr id="18" name="Octagon 17">
+            <a:extLst>
+              <a:ext uri="{FF2B5EF4-FFF2-40B4-BE49-F238E27FC236}">
+                <a16:creationId xmlns:a16="http://schemas.microsoft.com/office/drawing/2014/main" id="{946A918E-F8EE-6F40-9E15-048E3BE0D1CF}"/>
+              </a:ext>
+            </a:extLst>
+          </p:cNvPr>
+          <p:cNvSpPr/>
+          <p:nvPr/>
+        </p:nvSpPr>
+        <p:spPr>
+          <a:xfrm>
+            <a:off x="9838552" y="589723"/>
+            <a:ext cx="364211" cy="357205"/>
+          </a:xfrm>
+          <a:prstGeom prst="octagon">
+            <a:avLst/>
+          </a:prstGeom>
+        </p:spPr>
+        <p:style>
+          <a:lnRef idx="2">
+            <a:schemeClr val="accent1">
+              <a:shade val="50000"/>
+            </a:schemeClr>
+          </a:lnRef>
+          <a:fillRef idx="1">
+            <a:schemeClr val="accent1"/>
+          </a:fillRef>
+          <a:effectRef idx="0">
+            <a:schemeClr val="accent1"/>
+          </a:effectRef>
+          <a:fontRef idx="minor">
+            <a:schemeClr val="lt1"/>
+          </a:fontRef>
+        </p:style>
+        <p:txBody>
+          <a:bodyPr rtlCol="0" anchor="ctr"/>
+          <a:lstStyle/>
+          <a:p>
+            <a:pPr algn="ctr"/>
+            <a:r>
+              <a:rPr lang="en-US" dirty="0"/>
+              <a:t>7</a:t>
             </a:r>
           </a:p>
         </p:txBody>

</xml_diff>